<commit_message>
Typo fix presentation about deep law
</commit_message>
<xml_diff>
--- a/Управление проектами/DeepLAW.pptx
+++ b/Управление проектами/DeepLAW.pptx
@@ -5804,7 +5804,11 @@
           <a:p>
             <a:r>
               <a:rPr lang="en-US" sz="2800" dirty="0"/>
-              <a:t>IMPROVE THE WORLD TOADY</a:t>
+              <a:t>IMPROVE THE </a:t>
+            </a:r>
+            <a:r>
+              <a:rPr lang="en-US" sz="2800"/>
+              <a:t>WORLD TODAY</a:t>
             </a:r>
             <a:endParaRPr lang="ru-RU" sz="2800" dirty="0"/>
           </a:p>

</xml_diff>